<commit_message>
base game done, will add more feature.
</commit_message>
<xml_diff>
--- a/381.pptx
+++ b/381.pptx
@@ -5,7 +5,7 @@
     <p:sldMasterId id="2147483728" r:id="rId1"/>
   </p:sldMasterIdLst>
   <p:notesMasterIdLst>
-    <p:notesMasterId r:id="rId13"/>
+    <p:notesMasterId r:id="rId15"/>
   </p:notesMasterIdLst>
   <p:sldIdLst>
     <p:sldId id="256" r:id="rId2"/>
@@ -13,12 +13,14 @@
     <p:sldId id="257" r:id="rId4"/>
     <p:sldId id="258" r:id="rId5"/>
     <p:sldId id="259" r:id="rId6"/>
-    <p:sldId id="263" r:id="rId7"/>
+    <p:sldId id="269" r:id="rId7"/>
     <p:sldId id="264" r:id="rId8"/>
-    <p:sldId id="265" r:id="rId9"/>
-    <p:sldId id="266" r:id="rId10"/>
-    <p:sldId id="267" r:id="rId11"/>
-    <p:sldId id="261" r:id="rId12"/>
+    <p:sldId id="268" r:id="rId9"/>
+    <p:sldId id="270" r:id="rId10"/>
+    <p:sldId id="265" r:id="rId11"/>
+    <p:sldId id="267" r:id="rId12"/>
+    <p:sldId id="266" r:id="rId13"/>
+    <p:sldId id="261" r:id="rId14"/>
   </p:sldIdLst>
   <p:sldSz cx="12192000" cy="6858000"/>
   <p:notesSz cx="6858000" cy="9144000"/>
@@ -117,6 +119,11 @@
       </a:defRPr>
     </a:lvl9pPr>
   </p:defaultTextStyle>
+  <p:extLst>
+    <p:ext uri="{EFAFB233-063F-42B5-8137-9DF3F51BA10A}">
+      <p15:sldGuideLst xmlns:p15="http://schemas.microsoft.com/office/powerpoint/2012/main"/>
+    </p:ext>
+  </p:extLst>
 </p:presentation>
 </file>
 
@@ -202,7 +209,7 @@
           <a:p>
             <a:fld id="{8A0FDB67-258E-4DAF-8EA6-267D141714F9}" type="datetimeFigureOut">
               <a:rPr lang="en-US" smtClean="0"/>
-              <a:t>10/30/2019</a:t>
+              <a:t>10/31/19</a:t>
             </a:fld>
             <a:endParaRPr lang="en-US"/>
           </a:p>
@@ -637,6 +644,174 @@
 </p:notes>
 </file>
 
+<file path=ppt/notesSlides/notesSlide3.xml><?xml version="1.0" encoding="utf-8"?>
+<p:notes xmlns:a="http://schemas.openxmlformats.org/drawingml/2006/main" xmlns:r="http://schemas.openxmlformats.org/officeDocument/2006/relationships" xmlns:p="http://schemas.openxmlformats.org/presentationml/2006/main">
+  <p:cSld>
+    <p:spTree>
+      <p:nvGrpSpPr>
+        <p:cNvPr id="1" name=""/>
+        <p:cNvGrpSpPr/>
+        <p:nvPr/>
+      </p:nvGrpSpPr>
+      <p:grpSpPr>
+        <a:xfrm>
+          <a:off x="0" y="0"/>
+          <a:ext cx="0" cy="0"/>
+          <a:chOff x="0" y="0"/>
+          <a:chExt cx="0" cy="0"/>
+        </a:xfrm>
+      </p:grpSpPr>
+      <p:sp>
+        <p:nvSpPr>
+          <p:cNvPr id="2" name="Slide Image Placeholder 1"/>
+          <p:cNvSpPr>
+            <a:spLocks noGrp="1" noRot="1" noChangeAspect="1"/>
+          </p:cNvSpPr>
+          <p:nvPr>
+            <p:ph type="sldImg"/>
+          </p:nvPr>
+        </p:nvSpPr>
+        <p:spPr/>
+      </p:sp>
+      <p:sp>
+        <p:nvSpPr>
+          <p:cNvPr id="3" name="Notes Placeholder 2"/>
+          <p:cNvSpPr>
+            <a:spLocks noGrp="1"/>
+          </p:cNvSpPr>
+          <p:nvPr>
+            <p:ph type="body" idx="1"/>
+          </p:nvPr>
+        </p:nvSpPr>
+        <p:spPr/>
+        <p:txBody>
+          <a:bodyPr/>
+          <a:lstStyle/>
+          <a:p>
+            <a:endParaRPr lang="en-US" dirty="0"/>
+          </a:p>
+        </p:txBody>
+      </p:sp>
+      <p:sp>
+        <p:nvSpPr>
+          <p:cNvPr id="4" name="Slide Number Placeholder 3"/>
+          <p:cNvSpPr>
+            <a:spLocks noGrp="1"/>
+          </p:cNvSpPr>
+          <p:nvPr>
+            <p:ph type="sldNum" sz="quarter" idx="5"/>
+          </p:nvPr>
+        </p:nvSpPr>
+        <p:spPr/>
+        <p:txBody>
+          <a:bodyPr/>
+          <a:lstStyle/>
+          <a:p>
+            <a:fld id="{8C63A22C-B8E5-4B73-8529-787C8B88F2E2}" type="slidenum">
+              <a:rPr lang="en-US" smtClean="0"/>
+              <a:t>8</a:t>
+            </a:fld>
+            <a:endParaRPr lang="en-US"/>
+          </a:p>
+        </p:txBody>
+      </p:sp>
+    </p:spTree>
+    <p:extLst>
+      <p:ext uri="{BB962C8B-B14F-4D97-AF65-F5344CB8AC3E}">
+        <p14:creationId xmlns:p14="http://schemas.microsoft.com/office/powerpoint/2010/main" val="1039082610"/>
+      </p:ext>
+    </p:extLst>
+  </p:cSld>
+  <p:clrMapOvr>
+    <a:masterClrMapping/>
+  </p:clrMapOvr>
+</p:notes>
+</file>
+
+<file path=ppt/notesSlides/notesSlide4.xml><?xml version="1.0" encoding="utf-8"?>
+<p:notes xmlns:a="http://schemas.openxmlformats.org/drawingml/2006/main" xmlns:r="http://schemas.openxmlformats.org/officeDocument/2006/relationships" xmlns:p="http://schemas.openxmlformats.org/presentationml/2006/main">
+  <p:cSld>
+    <p:spTree>
+      <p:nvGrpSpPr>
+        <p:cNvPr id="1" name=""/>
+        <p:cNvGrpSpPr/>
+        <p:nvPr/>
+      </p:nvGrpSpPr>
+      <p:grpSpPr>
+        <a:xfrm>
+          <a:off x="0" y="0"/>
+          <a:ext cx="0" cy="0"/>
+          <a:chOff x="0" y="0"/>
+          <a:chExt cx="0" cy="0"/>
+        </a:xfrm>
+      </p:grpSpPr>
+      <p:sp>
+        <p:nvSpPr>
+          <p:cNvPr id="2" name="Slide Image Placeholder 1"/>
+          <p:cNvSpPr>
+            <a:spLocks noGrp="1" noRot="1" noChangeAspect="1"/>
+          </p:cNvSpPr>
+          <p:nvPr>
+            <p:ph type="sldImg"/>
+          </p:nvPr>
+        </p:nvSpPr>
+        <p:spPr/>
+      </p:sp>
+      <p:sp>
+        <p:nvSpPr>
+          <p:cNvPr id="3" name="Notes Placeholder 2"/>
+          <p:cNvSpPr>
+            <a:spLocks noGrp="1"/>
+          </p:cNvSpPr>
+          <p:nvPr>
+            <p:ph type="body" idx="1"/>
+          </p:nvPr>
+        </p:nvSpPr>
+        <p:spPr/>
+        <p:txBody>
+          <a:bodyPr/>
+          <a:lstStyle/>
+          <a:p>
+            <a:endParaRPr lang="en-US" dirty="0"/>
+          </a:p>
+        </p:txBody>
+      </p:sp>
+      <p:sp>
+        <p:nvSpPr>
+          <p:cNvPr id="4" name="Slide Number Placeholder 3"/>
+          <p:cNvSpPr>
+            <a:spLocks noGrp="1"/>
+          </p:cNvSpPr>
+          <p:nvPr>
+            <p:ph type="sldNum" sz="quarter" idx="5"/>
+          </p:nvPr>
+        </p:nvSpPr>
+        <p:spPr/>
+        <p:txBody>
+          <a:bodyPr/>
+          <a:lstStyle/>
+          <a:p>
+            <a:fld id="{8C63A22C-B8E5-4B73-8529-787C8B88F2E2}" type="slidenum">
+              <a:rPr lang="en-US" smtClean="0"/>
+              <a:t>9</a:t>
+            </a:fld>
+            <a:endParaRPr lang="en-US"/>
+          </a:p>
+        </p:txBody>
+      </p:sp>
+    </p:spTree>
+    <p:extLst>
+      <p:ext uri="{BB962C8B-B14F-4D97-AF65-F5344CB8AC3E}">
+        <p14:creationId xmlns:p14="http://schemas.microsoft.com/office/powerpoint/2010/main" val="652688029"/>
+      </p:ext>
+    </p:extLst>
+  </p:cSld>
+  <p:clrMapOvr>
+    <a:masterClrMapping/>
+  </p:clrMapOvr>
+</p:notes>
+</file>
+
 <file path=ppt/slideLayouts/slideLayout1.xml><?xml version="1.0" encoding="utf-8"?>
 <p:sldLayout xmlns:a="http://schemas.openxmlformats.org/drawingml/2006/main" xmlns:r="http://schemas.openxmlformats.org/officeDocument/2006/relationships" xmlns:p="http://schemas.openxmlformats.org/presentationml/2006/main" type="title" preserve="1">
   <p:cSld name="Title Slide">
@@ -825,7 +1000,7 @@
           <a:p>
             <a:fld id="{022600E7-BEE4-4D85-B4BB-6707EF49441B}" type="datetimeFigureOut">
               <a:rPr lang="en-US" smtClean="0"/>
-              <a:t>10/30/2019</a:t>
+              <a:t>10/31/19</a:t>
             </a:fld>
             <a:endParaRPr lang="en-US"/>
           </a:p>
@@ -1163,7 +1338,7 @@
           <a:p>
             <a:fld id="{022600E7-BEE4-4D85-B4BB-6707EF49441B}" type="datetimeFigureOut">
               <a:rPr lang="en-US" smtClean="0"/>
-              <a:t>10/30/2019</a:t>
+              <a:t>10/31/19</a:t>
             </a:fld>
             <a:endParaRPr lang="en-US"/>
           </a:p>
@@ -1564,7 +1739,7 @@
           <a:p>
             <a:fld id="{022600E7-BEE4-4D85-B4BB-6707EF49441B}" type="datetimeFigureOut">
               <a:rPr lang="en-US" smtClean="0"/>
-              <a:t>10/30/2019</a:t>
+              <a:t>10/31/19</a:t>
             </a:fld>
             <a:endParaRPr lang="en-US"/>
           </a:p>
@@ -1899,7 +2074,7 @@
           <a:p>
             <a:fld id="{022600E7-BEE4-4D85-B4BB-6707EF49441B}" type="datetimeFigureOut">
               <a:rPr lang="en-US" smtClean="0"/>
-              <a:t>10/30/2019</a:t>
+              <a:t>10/31/19</a:t>
             </a:fld>
             <a:endParaRPr lang="en-US"/>
           </a:p>
@@ -2219,7 +2394,7 @@
           <a:p>
             <a:fld id="{022600E7-BEE4-4D85-B4BB-6707EF49441B}" type="datetimeFigureOut">
               <a:rPr lang="en-US" smtClean="0"/>
-              <a:t>10/30/2019</a:t>
+              <a:t>10/31/19</a:t>
             </a:fld>
             <a:endParaRPr lang="en-US"/>
           </a:p>
@@ -2615,7 +2790,7 @@
           <a:p>
             <a:fld id="{022600E7-BEE4-4D85-B4BB-6707EF49441B}" type="datetimeFigureOut">
               <a:rPr lang="en-US" smtClean="0"/>
-              <a:t>10/30/2019</a:t>
+              <a:t>10/31/19</a:t>
             </a:fld>
             <a:endParaRPr lang="en-US"/>
           </a:p>
@@ -2872,7 +3047,7 @@
           <a:p>
             <a:fld id="{022600E7-BEE4-4D85-B4BB-6707EF49441B}" type="datetimeFigureOut">
               <a:rPr lang="en-US" smtClean="0"/>
-              <a:t>10/30/2019</a:t>
+              <a:t>10/31/19</a:t>
             </a:fld>
             <a:endParaRPr lang="en-US"/>
           </a:p>
@@ -3134,7 +3309,7 @@
           <a:p>
             <a:fld id="{022600E7-BEE4-4D85-B4BB-6707EF49441B}" type="datetimeFigureOut">
               <a:rPr lang="en-US" smtClean="0"/>
-              <a:t>10/30/2019</a:t>
+              <a:t>10/31/19</a:t>
             </a:fld>
             <a:endParaRPr lang="en-US"/>
           </a:p>
@@ -3396,7 +3571,7 @@
           <a:p>
             <a:fld id="{022600E7-BEE4-4D85-B4BB-6707EF49441B}" type="datetimeFigureOut">
               <a:rPr lang="en-US" smtClean="0"/>
-              <a:t>10/30/2019</a:t>
+              <a:t>10/31/19</a:t>
             </a:fld>
             <a:endParaRPr lang="en-US"/>
           </a:p>
@@ -3725,7 +3900,7 @@
           <a:p>
             <a:fld id="{022600E7-BEE4-4D85-B4BB-6707EF49441B}" type="datetimeFigureOut">
               <a:rPr lang="en-US" smtClean="0"/>
-              <a:t>10/30/2019</a:t>
+              <a:t>10/31/19</a:t>
             </a:fld>
             <a:endParaRPr lang="en-US"/>
           </a:p>
@@ -4048,7 +4223,7 @@
           <a:p>
             <a:fld id="{022600E7-BEE4-4D85-B4BB-6707EF49441B}" type="datetimeFigureOut">
               <a:rPr lang="en-US" smtClean="0"/>
-              <a:t>10/30/2019</a:t>
+              <a:t>10/31/19</a:t>
             </a:fld>
             <a:endParaRPr lang="en-US"/>
           </a:p>
@@ -4505,7 +4680,7 @@
           <a:p>
             <a:fld id="{022600E7-BEE4-4D85-B4BB-6707EF49441B}" type="datetimeFigureOut">
               <a:rPr lang="en-US" smtClean="0"/>
-              <a:t>10/30/2019</a:t>
+              <a:t>10/31/19</a:t>
             </a:fld>
             <a:endParaRPr lang="en-US"/>
           </a:p>
@@ -4710,7 +4885,7 @@
           <a:p>
             <a:fld id="{022600E7-BEE4-4D85-B4BB-6707EF49441B}" type="datetimeFigureOut">
               <a:rPr lang="en-US" smtClean="0"/>
-              <a:t>10/30/2019</a:t>
+              <a:t>10/31/19</a:t>
             </a:fld>
             <a:endParaRPr lang="en-US"/>
           </a:p>
@@ -4887,7 +5062,7 @@
           <a:p>
             <a:fld id="{022600E7-BEE4-4D85-B4BB-6707EF49441B}" type="datetimeFigureOut">
               <a:rPr lang="en-US" smtClean="0"/>
-              <a:t>10/30/2019</a:t>
+              <a:t>10/31/19</a:t>
             </a:fld>
             <a:endParaRPr lang="en-US"/>
           </a:p>
@@ -5220,7 +5395,7 @@
           <a:p>
             <a:fld id="{022600E7-BEE4-4D85-B4BB-6707EF49441B}" type="datetimeFigureOut">
               <a:rPr lang="en-US" smtClean="0"/>
-              <a:t>10/30/2019</a:t>
+              <a:t>10/31/19</a:t>
             </a:fld>
             <a:endParaRPr lang="en-US"/>
           </a:p>
@@ -5565,7 +5740,7 @@
           <a:p>
             <a:fld id="{022600E7-BEE4-4D85-B4BB-6707EF49441B}" type="datetimeFigureOut">
               <a:rPr lang="en-US" smtClean="0"/>
-              <a:t>10/30/2019</a:t>
+              <a:t>10/31/19</a:t>
             </a:fld>
             <a:endParaRPr lang="en-US"/>
           </a:p>
@@ -7682,7 +7857,7 @@
           <a:p>
             <a:fld id="{022600E7-BEE4-4D85-B4BB-6707EF49441B}" type="datetimeFigureOut">
               <a:rPr lang="en-US" smtClean="0"/>
-              <a:t>10/30/2019</a:t>
+              <a:t>10/31/19</a:t>
             </a:fld>
             <a:endParaRPr lang="en-US"/>
           </a:p>
@@ -8214,7 +8389,7 @@
           <p:cNvPr id="2" name="Title 1">
             <a:extLst>
               <a:ext uri="{FF2B5EF4-FFF2-40B4-BE49-F238E27FC236}">
-                <a16:creationId xmlns:a16="http://schemas.microsoft.com/office/drawing/2014/main" id="{D5C62DC0-7B24-406B-895F-9F7A998B97F5}"/>
+                <a16:creationId xmlns:a16="http://schemas.microsoft.com/office/drawing/2014/main" xmlns="" id="{D5C62DC0-7B24-406B-895F-9F7A998B97F5}"/>
               </a:ext>
             </a:extLst>
           </p:cNvPr>
@@ -8239,7 +8414,7 @@
           <p:cNvPr id="3" name="Subtitle 2">
             <a:extLst>
               <a:ext uri="{FF2B5EF4-FFF2-40B4-BE49-F238E27FC236}">
-                <a16:creationId xmlns:a16="http://schemas.microsoft.com/office/drawing/2014/main" id="{BC722BCA-39B6-466D-8B59-13CEFC854F1C}"/>
+                <a16:creationId xmlns:a16="http://schemas.microsoft.com/office/drawing/2014/main" xmlns="" id="{BC722BCA-39B6-466D-8B59-13CEFC854F1C}"/>
               </a:ext>
             </a:extLst>
           </p:cNvPr>
@@ -8303,7 +8478,7 @@
           <p:cNvPr id="15" name="Picture 3" descr="A picture containing rain&#10;&#10;Description automatically generated">
             <a:extLst>
               <a:ext uri="{FF2B5EF4-FFF2-40B4-BE49-F238E27FC236}">
-                <a16:creationId xmlns:a16="http://schemas.microsoft.com/office/drawing/2014/main" id="{5ED1E333-3635-4CA6-AFDB-F8A6394D9954}"/>
+                <a16:creationId xmlns:a16="http://schemas.microsoft.com/office/drawing/2014/main" xmlns="" id="{5ED1E333-3635-4CA6-AFDB-F8A6394D9954}"/>
               </a:ext>
             </a:extLst>
           </p:cNvPr>
@@ -8341,7 +8516,7 @@
           <p:cNvPr id="4" name="Rectangle 3">
             <a:extLst>
               <a:ext uri="{FF2B5EF4-FFF2-40B4-BE49-F238E27FC236}">
-                <a16:creationId xmlns:a16="http://schemas.microsoft.com/office/drawing/2014/main" id="{8AAD79F5-1511-406F-9CD3-A4BD825C32E7}"/>
+                <a16:creationId xmlns:a16="http://schemas.microsoft.com/office/drawing/2014/main" xmlns="" id="{8AAD79F5-1511-406F-9CD3-A4BD825C32E7}"/>
               </a:ext>
             </a:extLst>
           </p:cNvPr>
@@ -8391,7 +8566,7 @@
           <p:cNvPr id="5" name="Rectangle 4">
             <a:extLst>
               <a:ext uri="{FF2B5EF4-FFF2-40B4-BE49-F238E27FC236}">
-                <a16:creationId xmlns:a16="http://schemas.microsoft.com/office/drawing/2014/main" id="{1E345FDF-A275-4E6E-8621-3DF090845A72}"/>
+                <a16:creationId xmlns:a16="http://schemas.microsoft.com/office/drawing/2014/main" xmlns="" id="{1E345FDF-A275-4E6E-8621-3DF090845A72}"/>
               </a:ext>
             </a:extLst>
           </p:cNvPr>
@@ -8400,8 +8575,8 @@
         </p:nvSpPr>
         <p:spPr>
           <a:xfrm>
-            <a:off x="958652" y="1822546"/>
-            <a:ext cx="3773790" cy="707886"/>
+            <a:off x="1016000" y="1688414"/>
+            <a:ext cx="6340033" cy="707886"/>
           </a:xfrm>
           <a:prstGeom prst="rect">
             <a:avLst/>
@@ -8409,14 +8584,13 @@
           <a:noFill/>
         </p:spPr>
         <p:txBody>
-          <a:bodyPr wrap="none" lIns="91440" tIns="45720" rIns="91440" bIns="45720">
+          <a:bodyPr wrap="square" lIns="91440" tIns="45720" rIns="91440" bIns="45720">
             <a:spAutoFit/>
           </a:bodyPr>
           <a:lstStyle/>
           <a:p>
-            <a:pPr algn="ctr"/>
-            <a:r>
-              <a:rPr lang="en-US" altLang="zh-CN" sz="4000" dirty="0">
+            <a:r>
+              <a:rPr lang="en-US" sz="4000" smtClean="0">
                 <a:ln w="0"/>
                 <a:effectLst>
                   <a:outerShdw blurRad="38100" dist="19050" dir="2700000" algn="tl" rotWithShape="0">
@@ -8426,7 +8600,7 @@
                   </a:outerShdw>
                 </a:effectLst>
               </a:rPr>
-              <a:t>Money System</a:t>
+              <a:t>How Guinea Pig Merge:</a:t>
             </a:r>
             <a:endParaRPr lang="en-US" sz="4000" b="0" cap="none" spc="0" dirty="0">
               <a:ln w="0"/>
@@ -8444,16 +8618,126 @@
           </a:p>
         </p:txBody>
       </p:sp>
+      <p:sp>
+        <p:nvSpPr>
+          <p:cNvPr id="2" name="TextBox 1">
+            <a:extLst>
+              <a:ext uri="{FF2B5EF4-FFF2-40B4-BE49-F238E27FC236}">
+                <a16:creationId xmlns:a16="http://schemas.microsoft.com/office/drawing/2014/main" xmlns="" id="{CC5E8047-081E-47C2-878D-24EF5A309D31}"/>
+              </a:ext>
+            </a:extLst>
+          </p:cNvPr>
+          <p:cNvSpPr txBox="1"/>
+          <p:nvPr/>
+        </p:nvSpPr>
+        <p:spPr>
+          <a:xfrm>
+            <a:off x="2323707" y="2545237"/>
+            <a:ext cx="7692272" cy="2862322"/>
+          </a:xfrm>
+          <a:prstGeom prst="rect">
+            <a:avLst/>
+          </a:prstGeom>
+          <a:noFill/>
+        </p:spPr>
+        <p:txBody>
+          <a:bodyPr wrap="square" rtlCol="0">
+            <a:spAutoFit/>
+          </a:bodyPr>
+          <a:lstStyle/>
+          <a:p>
+            <a:r>
+              <a:rPr lang="en-US" dirty="0" smtClean="0"/>
+              <a:t>Once </a:t>
+            </a:r>
+            <a:r>
+              <a:rPr lang="en-US" dirty="0"/>
+              <a:t>there are two teams </a:t>
+            </a:r>
+            <a:r>
+              <a:rPr lang="en-US" dirty="0" smtClean="0"/>
+              <a:t>go </a:t>
+            </a:r>
+            <a:r>
+              <a:rPr lang="en-US" dirty="0"/>
+              <a:t>cross with each other, one team will wait for the other team to pass and the first pig of this team will follow the last pig of the other team</a:t>
+            </a:r>
+            <a:r>
+              <a:rPr lang="en-US" dirty="0" smtClean="0"/>
+              <a:t>.</a:t>
+            </a:r>
+          </a:p>
+          <a:p>
+            <a:endParaRPr lang="en-US" dirty="0"/>
+          </a:p>
+          <a:p>
+            <a:r>
+              <a:rPr lang="en-US" dirty="0" smtClean="0"/>
+              <a:t>If two guinea pig next to the same timothy:</a:t>
+            </a:r>
+          </a:p>
+          <a:p>
+            <a:r>
+              <a:rPr lang="en-US" dirty="0"/>
+              <a:t> </a:t>
+            </a:r>
+            <a:r>
+              <a:rPr lang="en-US" dirty="0" smtClean="0"/>
+              <a:t>   If they are in the same team, the leader(head) of the guinea pig team will notice the timothy but the other one won’t. (Leader has higher priority)</a:t>
+            </a:r>
+          </a:p>
+          <a:p>
+            <a:r>
+              <a:rPr lang="en-US" dirty="0"/>
+              <a:t> </a:t>
+            </a:r>
+            <a:r>
+              <a:rPr lang="en-US" dirty="0" smtClean="0"/>
+              <a:t>   If they are in different teams, then both team merge.</a:t>
+            </a:r>
+          </a:p>
+          <a:p>
+            <a:r>
+              <a:rPr lang="zh-CN" altLang="en-US" dirty="0" smtClean="0"/>
+              <a:t>（</a:t>
+            </a:r>
+            <a:r>
+              <a:rPr lang="zh-CN" altLang="en-US" dirty="0" smtClean="0"/>
+              <a:t>当</a:t>
+            </a:r>
+            <a:r>
+              <a:rPr lang="zh-CN" altLang="en-US" smtClean="0"/>
+              <a:t>一只猪刚好</a:t>
+            </a:r>
+            <a:r>
+              <a:rPr lang="zh-CN" altLang="en-US" dirty="0" smtClean="0"/>
+              <a:t>背对着草，它也会转方向吗？</a:t>
+            </a:r>
+            <a:r>
+              <a:rPr lang="zh-CN" altLang="en-US" dirty="0" smtClean="0"/>
+              <a:t>）</a:t>
+            </a:r>
+            <a:endParaRPr lang="en-US" dirty="0"/>
+          </a:p>
+        </p:txBody>
+      </p:sp>
     </p:spTree>
     <p:extLst>
       <p:ext uri="{BB962C8B-B14F-4D97-AF65-F5344CB8AC3E}">
-        <p14:creationId xmlns:p14="http://schemas.microsoft.com/office/powerpoint/2010/main" val="4239426743"/>
+        <p14:creationId xmlns:p14="http://schemas.microsoft.com/office/powerpoint/2010/main" val="549746681"/>
       </p:ext>
     </p:extLst>
   </p:cSld>
   <p:clrMapOvr>
     <a:masterClrMapping/>
   </p:clrMapOvr>
+  <p:timing>
+    <p:tnLst>
+      <p:par>
+        <p:cTn id="1" dur="indefinite" restart="never" nodeType="tmRoot"/>
+      </p:par>
+    </p:tnLst>
+  </p:timing>
 </p:sld>
 </file>
 
@@ -8488,7 +8772,7 @@
           <p:cNvPr id="15" name="Picture 3" descr="A picture containing rain&#10;&#10;Description automatically generated">
             <a:extLst>
               <a:ext uri="{FF2B5EF4-FFF2-40B4-BE49-F238E27FC236}">
-                <a16:creationId xmlns:a16="http://schemas.microsoft.com/office/drawing/2014/main" id="{5ED1E333-3635-4CA6-AFDB-F8A6394D9954}"/>
+                <a16:creationId xmlns:a16="http://schemas.microsoft.com/office/drawing/2014/main" xmlns="" id="{5ED1E333-3635-4CA6-AFDB-F8A6394D9954}"/>
               </a:ext>
             </a:extLst>
           </p:cNvPr>
@@ -8523,10 +8807,534 @@
       </p:pic>
       <p:sp>
         <p:nvSpPr>
+          <p:cNvPr id="4" name="Rectangle 3">
+            <a:extLst>
+              <a:ext uri="{FF2B5EF4-FFF2-40B4-BE49-F238E27FC236}">
+                <a16:creationId xmlns:a16="http://schemas.microsoft.com/office/drawing/2014/main" xmlns="" id="{8AAD79F5-1511-406F-9CD3-A4BD825C32E7}"/>
+              </a:ext>
+            </a:extLst>
+          </p:cNvPr>
+          <p:cNvSpPr/>
+          <p:nvPr/>
+        </p:nvSpPr>
+        <p:spPr>
+          <a:xfrm>
+            <a:off x="880626" y="488085"/>
+            <a:ext cx="5594801" cy="1200329"/>
+          </a:xfrm>
+          <a:prstGeom prst="rect">
+            <a:avLst/>
+          </a:prstGeom>
+          <a:noFill/>
+        </p:spPr>
+        <p:txBody>
+          <a:bodyPr wrap="none" lIns="91440" tIns="45720" rIns="91440" bIns="45720">
+            <a:spAutoFit/>
+          </a:bodyPr>
+          <a:lstStyle/>
+          <a:p>
+            <a:pPr algn="ctr"/>
+            <a:r>
+              <a:rPr lang="en-US" sz="7200" b="1" cap="none" spc="0" dirty="0">
+                <a:ln w="22225">
+                  <a:solidFill>
+                    <a:schemeClr val="accent2"/>
+                  </a:solidFill>
+                  <a:prstDash val="solid"/>
+                </a:ln>
+                <a:solidFill>
+                  <a:schemeClr val="accent2">
+                    <a:lumMod val="40000"/>
+                    <a:lumOff val="60000"/>
+                  </a:schemeClr>
+                </a:solidFill>
+                <a:effectLst/>
+              </a:rPr>
+              <a:t>Game Rules</a:t>
+            </a:r>
+          </a:p>
+        </p:txBody>
+      </p:sp>
+      <p:sp>
+        <p:nvSpPr>
+          <p:cNvPr id="5" name="Rectangle 4">
+            <a:extLst>
+              <a:ext uri="{FF2B5EF4-FFF2-40B4-BE49-F238E27FC236}">
+                <a16:creationId xmlns:a16="http://schemas.microsoft.com/office/drawing/2014/main" xmlns="" id="{1E345FDF-A275-4E6E-8621-3DF090845A72}"/>
+              </a:ext>
+            </a:extLst>
+          </p:cNvPr>
+          <p:cNvSpPr/>
+          <p:nvPr/>
+        </p:nvSpPr>
+        <p:spPr>
+          <a:xfrm>
+            <a:off x="958652" y="1822546"/>
+            <a:ext cx="3773790" cy="707886"/>
+          </a:xfrm>
+          <a:prstGeom prst="rect">
+            <a:avLst/>
+          </a:prstGeom>
+          <a:noFill/>
+        </p:spPr>
+        <p:txBody>
+          <a:bodyPr wrap="none" lIns="91440" tIns="45720" rIns="91440" bIns="45720">
+            <a:spAutoFit/>
+          </a:bodyPr>
+          <a:lstStyle/>
+          <a:p>
+            <a:pPr algn="ctr"/>
+            <a:r>
+              <a:rPr lang="en-US" altLang="zh-CN" sz="4000" dirty="0">
+                <a:ln w="0"/>
+                <a:effectLst>
+                  <a:outerShdw blurRad="38100" dist="19050" dir="2700000" algn="tl" rotWithShape="0">
+                    <a:schemeClr val="dk1">
+                      <a:alpha val="40000"/>
+                    </a:schemeClr>
+                  </a:outerShdw>
+                </a:effectLst>
+              </a:rPr>
+              <a:t>Money System</a:t>
+            </a:r>
+            <a:endParaRPr lang="en-US" sz="4000" b="0" cap="none" spc="0" dirty="0">
+              <a:ln w="0"/>
+              <a:solidFill>
+                <a:schemeClr val="tx1"/>
+              </a:solidFill>
+              <a:effectLst>
+                <a:outerShdw blurRad="38100" dist="19050" dir="2700000" algn="tl" rotWithShape="0">
+                  <a:schemeClr val="dk1">
+                    <a:alpha val="40000"/>
+                  </a:schemeClr>
+                </a:outerShdw>
+              </a:effectLst>
+            </a:endParaRPr>
+          </a:p>
+        </p:txBody>
+      </p:sp>
+      <p:sp>
+        <p:nvSpPr>
+          <p:cNvPr id="2" name="TextBox 1">
+            <a:extLst>
+              <a:ext uri="{FF2B5EF4-FFF2-40B4-BE49-F238E27FC236}">
+                <a16:creationId xmlns:a16="http://schemas.microsoft.com/office/drawing/2014/main" xmlns="" id="{88CB1315-EA08-4E1F-AA1F-CDEAE6EC3E6B}"/>
+              </a:ext>
+            </a:extLst>
+          </p:cNvPr>
+          <p:cNvSpPr txBox="1"/>
+          <p:nvPr/>
+        </p:nvSpPr>
+        <p:spPr>
+          <a:xfrm>
+            <a:off x="3063711" y="3030718"/>
+            <a:ext cx="7291633" cy="2585323"/>
+          </a:xfrm>
+          <a:prstGeom prst="rect">
+            <a:avLst/>
+          </a:prstGeom>
+          <a:noFill/>
+        </p:spPr>
+        <p:txBody>
+          <a:bodyPr wrap="square" rtlCol="0">
+            <a:spAutoFit/>
+          </a:bodyPr>
+          <a:lstStyle/>
+          <a:p>
+            <a:r>
+              <a:rPr lang="en-US" dirty="0"/>
+              <a:t>There will be </a:t>
+            </a:r>
+            <a:r>
+              <a:rPr lang="en-US" dirty="0" smtClean="0"/>
+              <a:t>coins placed </a:t>
+            </a:r>
+            <a:r>
+              <a:rPr lang="en-US" dirty="0"/>
+              <a:t>on the ground.</a:t>
+            </a:r>
+          </a:p>
+          <a:p>
+            <a:endParaRPr lang="en-US" dirty="0"/>
+          </a:p>
+          <a:p>
+            <a:r>
+              <a:rPr lang="en-US" dirty="0" smtClean="0"/>
+              <a:t>The player </a:t>
+            </a:r>
+            <a:r>
+              <a:rPr lang="en-US" dirty="0"/>
+              <a:t>can pick up the </a:t>
+            </a:r>
+            <a:r>
+              <a:rPr lang="en-US" dirty="0" smtClean="0"/>
+              <a:t>coins </a:t>
+            </a:r>
+            <a:r>
+              <a:rPr lang="en-US" dirty="0"/>
+              <a:t>by guiding the guinea pigs to the grid where the money is placed</a:t>
+            </a:r>
+          </a:p>
+          <a:p>
+            <a:endParaRPr lang="en-US" dirty="0"/>
+          </a:p>
+          <a:p>
+            <a:r>
+              <a:rPr lang="en-US" dirty="0" smtClean="0"/>
+              <a:t>Coins </a:t>
+            </a:r>
+            <a:r>
+              <a:rPr lang="en-US" dirty="0"/>
+              <a:t>can be used to </a:t>
+            </a:r>
+            <a:r>
+              <a:rPr lang="en-US" dirty="0" smtClean="0"/>
+              <a:t>exchange tools in tool bar.</a:t>
+            </a:r>
+          </a:p>
+          <a:p>
+            <a:endParaRPr lang="en-US" dirty="0"/>
+          </a:p>
+          <a:p>
+            <a:r>
+              <a:rPr lang="en-US" dirty="0" smtClean="0"/>
+              <a:t>(At any time, tool bar will always be placed on the bottom of the screen.)</a:t>
+            </a:r>
+            <a:endParaRPr lang="en-US" dirty="0"/>
+          </a:p>
+        </p:txBody>
+      </p:sp>
+    </p:spTree>
+    <p:extLst>
+      <p:ext uri="{BB962C8B-B14F-4D97-AF65-F5344CB8AC3E}">
+        <p14:creationId xmlns:p14="http://schemas.microsoft.com/office/powerpoint/2010/main" val="4239426743"/>
+      </p:ext>
+    </p:extLst>
+  </p:cSld>
+  <p:clrMapOvr>
+    <a:masterClrMapping/>
+  </p:clrMapOvr>
+  <p:timing>
+    <p:tnLst>
+      <p:par>
+        <p:cTn id="1" dur="indefinite" restart="never" nodeType="tmRoot"/>
+      </p:par>
+    </p:tnLst>
+  </p:timing>
+</p:sld>
+</file>
+
+<file path=ppt/slides/slide12.xml><?xml version="1.0" encoding="utf-8"?>
+<p:sld xmlns:a="http://schemas.openxmlformats.org/drawingml/2006/main" xmlns:r="http://schemas.openxmlformats.org/officeDocument/2006/relationships" xmlns:p="http://schemas.openxmlformats.org/presentationml/2006/main">
+  <p:cSld>
+    <p:bg>
+      <p:bgPr>
+        <a:blipFill>
+          <a:blip r:embed="rId2"/>
+          <a:tile tx="0" ty="0" sx="100000" sy="100000" flip="none" algn="tl"/>
+        </a:blipFill>
+        <a:effectLst/>
+      </p:bgPr>
+    </p:bg>
+    <p:spTree>
+      <p:nvGrpSpPr>
+        <p:cNvPr id="1" name=""/>
+        <p:cNvGrpSpPr/>
+        <p:nvPr/>
+      </p:nvGrpSpPr>
+      <p:grpSpPr>
+        <a:xfrm>
+          <a:off x="0" y="0"/>
+          <a:ext cx="0" cy="0"/>
+          <a:chOff x="0" y="0"/>
+          <a:chExt cx="0" cy="0"/>
+        </a:xfrm>
+      </p:grpSpPr>
+      <p:pic>
+        <p:nvPicPr>
+          <p:cNvPr id="15" name="Picture 3" descr="A picture containing rain&#10;&#10;Description automatically generated">
+            <a:extLst>
+              <a:ext uri="{FF2B5EF4-FFF2-40B4-BE49-F238E27FC236}">
+                <a16:creationId xmlns:a16="http://schemas.microsoft.com/office/drawing/2014/main" xmlns="" id="{5ED1E333-3635-4CA6-AFDB-F8A6394D9954}"/>
+              </a:ext>
+            </a:extLst>
+          </p:cNvPr>
+          <p:cNvPicPr>
+            <a:picLocks noChangeAspect="1"/>
+          </p:cNvPicPr>
+          <p:nvPr/>
+        </p:nvPicPr>
+        <p:blipFill rotWithShape="1">
+          <a:blip r:embed="rId3">
+            <a:duotone>
+              <a:schemeClr val="bg2">
+                <a:shade val="45000"/>
+                <a:satMod val="135000"/>
+              </a:schemeClr>
+              <a:prstClr val="white"/>
+            </a:duotone>
+            <a:alphaModFix amt="25000"/>
+          </a:blip>
+          <a:srcRect t="15730"/>
+          <a:stretch/>
+        </p:blipFill>
+        <p:spPr>
+          <a:xfrm>
+            <a:off x="20" y="10"/>
+            <a:ext cx="12191980" cy="6857990"/>
+          </a:xfrm>
+          <a:prstGeom prst="rect">
+            <a:avLst/>
+          </a:prstGeom>
+        </p:spPr>
+      </p:pic>
+      <p:sp>
+        <p:nvSpPr>
+          <p:cNvPr id="4" name="Rectangle 3">
+            <a:extLst>
+              <a:ext uri="{FF2B5EF4-FFF2-40B4-BE49-F238E27FC236}">
+                <a16:creationId xmlns:a16="http://schemas.microsoft.com/office/drawing/2014/main" xmlns="" id="{8AAD79F5-1511-406F-9CD3-A4BD825C32E7}"/>
+              </a:ext>
+            </a:extLst>
+          </p:cNvPr>
+          <p:cNvSpPr/>
+          <p:nvPr/>
+        </p:nvSpPr>
+        <p:spPr>
+          <a:xfrm>
+            <a:off x="880626" y="488085"/>
+            <a:ext cx="5594801" cy="1200329"/>
+          </a:xfrm>
+          <a:prstGeom prst="rect">
+            <a:avLst/>
+          </a:prstGeom>
+          <a:noFill/>
+        </p:spPr>
+        <p:txBody>
+          <a:bodyPr wrap="none" lIns="91440" tIns="45720" rIns="91440" bIns="45720">
+            <a:spAutoFit/>
+          </a:bodyPr>
+          <a:lstStyle/>
+          <a:p>
+            <a:pPr algn="ctr"/>
+            <a:r>
+              <a:rPr lang="en-US" sz="7200" b="1" cap="none" spc="0" dirty="0">
+                <a:ln w="22225">
+                  <a:solidFill>
+                    <a:schemeClr val="accent2"/>
+                  </a:solidFill>
+                  <a:prstDash val="solid"/>
+                </a:ln>
+                <a:solidFill>
+                  <a:schemeClr val="accent2">
+                    <a:lumMod val="40000"/>
+                    <a:lumOff val="60000"/>
+                  </a:schemeClr>
+                </a:solidFill>
+                <a:effectLst/>
+              </a:rPr>
+              <a:t>Game Rules</a:t>
+            </a:r>
+          </a:p>
+        </p:txBody>
+      </p:sp>
+      <p:sp>
+        <p:nvSpPr>
+          <p:cNvPr id="5" name="Rectangle 4">
+            <a:extLst>
+              <a:ext uri="{FF2B5EF4-FFF2-40B4-BE49-F238E27FC236}">
+                <a16:creationId xmlns:a16="http://schemas.microsoft.com/office/drawing/2014/main" xmlns="" id="{1E345FDF-A275-4E6E-8621-3DF090845A72}"/>
+              </a:ext>
+            </a:extLst>
+          </p:cNvPr>
+          <p:cNvSpPr/>
+          <p:nvPr/>
+        </p:nvSpPr>
+        <p:spPr>
+          <a:xfrm>
+            <a:off x="880626" y="1688414"/>
+            <a:ext cx="7061550" cy="707886"/>
+          </a:xfrm>
+          <a:prstGeom prst="rect">
+            <a:avLst/>
+          </a:prstGeom>
+          <a:noFill/>
+        </p:spPr>
+        <p:txBody>
+          <a:bodyPr wrap="none" lIns="91440" tIns="45720" rIns="91440" bIns="45720">
+            <a:spAutoFit/>
+          </a:bodyPr>
+          <a:lstStyle/>
+          <a:p>
+            <a:pPr algn="ctr"/>
+            <a:r>
+              <a:rPr lang="en-US" sz="4000" dirty="0">
+                <a:ln w="0"/>
+                <a:effectLst>
+                  <a:outerShdw blurRad="38100" dist="19050" dir="2700000" algn="tl" rotWithShape="0">
+                    <a:schemeClr val="dk1">
+                      <a:alpha val="40000"/>
+                    </a:schemeClr>
+                  </a:outerShdw>
+                </a:effectLst>
+              </a:rPr>
+              <a:t>Dangerous situations (traps)</a:t>
+            </a:r>
+            <a:endParaRPr lang="en-US" sz="4000" b="0" cap="none" spc="0" dirty="0">
+              <a:ln w="0"/>
+              <a:solidFill>
+                <a:schemeClr val="tx1"/>
+              </a:solidFill>
+              <a:effectLst>
+                <a:outerShdw blurRad="38100" dist="19050" dir="2700000" algn="tl" rotWithShape="0">
+                  <a:schemeClr val="dk1">
+                    <a:alpha val="40000"/>
+                  </a:schemeClr>
+                </a:outerShdw>
+              </a:effectLst>
+            </a:endParaRPr>
+          </a:p>
+        </p:txBody>
+      </p:sp>
+      <p:sp>
+        <p:nvSpPr>
+          <p:cNvPr id="2" name="TextBox 1">
+            <a:extLst>
+              <a:ext uri="{FF2B5EF4-FFF2-40B4-BE49-F238E27FC236}">
+                <a16:creationId xmlns:a16="http://schemas.microsoft.com/office/drawing/2014/main" xmlns="" id="{00883B08-FB95-49D1-97D8-C77248CAB1D2}"/>
+              </a:ext>
+            </a:extLst>
+          </p:cNvPr>
+          <p:cNvSpPr txBox="1"/>
+          <p:nvPr/>
+        </p:nvSpPr>
+        <p:spPr>
+          <a:xfrm>
+            <a:off x="2964730" y="2710206"/>
+            <a:ext cx="8026924" cy="1200329"/>
+          </a:xfrm>
+          <a:prstGeom prst="rect">
+            <a:avLst/>
+          </a:prstGeom>
+          <a:noFill/>
+        </p:spPr>
+        <p:txBody>
+          <a:bodyPr wrap="square" rtlCol="0">
+            <a:spAutoFit/>
+          </a:bodyPr>
+          <a:lstStyle/>
+          <a:p>
+            <a:r>
+              <a:rPr lang="en-US" dirty="0"/>
+              <a:t>You will lose your guinea pig once it is fell into traps</a:t>
+            </a:r>
+          </a:p>
+          <a:p>
+            <a:endParaRPr lang="en-US" dirty="0"/>
+          </a:p>
+          <a:p>
+            <a:r>
+              <a:rPr lang="en-US" dirty="0"/>
+              <a:t>You can avoid this situations by making turns, using </a:t>
+            </a:r>
+            <a:r>
+              <a:rPr lang="en-US" dirty="0" smtClean="0"/>
+              <a:t>tools, or moving stuffs(e.g. furniture) in building.</a:t>
+            </a:r>
+            <a:endParaRPr lang="en-US" dirty="0"/>
+          </a:p>
+        </p:txBody>
+      </p:sp>
+    </p:spTree>
+    <p:extLst>
+      <p:ext uri="{BB962C8B-B14F-4D97-AF65-F5344CB8AC3E}">
+        <p14:creationId xmlns:p14="http://schemas.microsoft.com/office/powerpoint/2010/main" val="558036232"/>
+      </p:ext>
+    </p:extLst>
+  </p:cSld>
+  <p:clrMapOvr>
+    <a:masterClrMapping/>
+  </p:clrMapOvr>
+  <p:timing>
+    <p:tnLst>
+      <p:par>
+        <p:cTn id="1" dur="indefinite" restart="never" nodeType="tmRoot"/>
+      </p:par>
+    </p:tnLst>
+  </p:timing>
+</p:sld>
+</file>
+
+<file path=ppt/slides/slide13.xml><?xml version="1.0" encoding="utf-8"?>
+<p:sld xmlns:a="http://schemas.openxmlformats.org/drawingml/2006/main" xmlns:r="http://schemas.openxmlformats.org/officeDocument/2006/relationships" xmlns:p="http://schemas.openxmlformats.org/presentationml/2006/main">
+  <p:cSld>
+    <p:bg>
+      <p:bgPr>
+        <a:blipFill>
+          <a:blip r:embed="rId2"/>
+          <a:tile tx="0" ty="0" sx="100000" sy="100000" flip="none" algn="tl"/>
+        </a:blipFill>
+        <a:effectLst/>
+      </p:bgPr>
+    </p:bg>
+    <p:spTree>
+      <p:nvGrpSpPr>
+        <p:cNvPr id="1" name=""/>
+        <p:cNvGrpSpPr/>
+        <p:nvPr/>
+      </p:nvGrpSpPr>
+      <p:grpSpPr>
+        <a:xfrm>
+          <a:off x="0" y="0"/>
+          <a:ext cx="0" cy="0"/>
+          <a:chOff x="0" y="0"/>
+          <a:chExt cx="0" cy="0"/>
+        </a:xfrm>
+      </p:grpSpPr>
+      <p:pic>
+        <p:nvPicPr>
+          <p:cNvPr id="15" name="Picture 3" descr="A picture containing rain&#10;&#10;Description automatically generated">
+            <a:extLst>
+              <a:ext uri="{FF2B5EF4-FFF2-40B4-BE49-F238E27FC236}">
+                <a16:creationId xmlns:a16="http://schemas.microsoft.com/office/drawing/2014/main" xmlns="" id="{5ED1E333-3635-4CA6-AFDB-F8A6394D9954}"/>
+              </a:ext>
+            </a:extLst>
+          </p:cNvPr>
+          <p:cNvPicPr>
+            <a:picLocks noChangeAspect="1"/>
+          </p:cNvPicPr>
+          <p:nvPr/>
+        </p:nvPicPr>
+        <p:blipFill rotWithShape="1">
+          <a:blip r:embed="rId3">
+            <a:duotone>
+              <a:schemeClr val="bg2">
+                <a:shade val="45000"/>
+                <a:satMod val="135000"/>
+              </a:schemeClr>
+              <a:prstClr val="white"/>
+            </a:duotone>
+            <a:alphaModFix amt="25000"/>
+          </a:blip>
+          <a:srcRect t="15730"/>
+          <a:stretch/>
+        </p:blipFill>
+        <p:spPr>
+          <a:xfrm>
+            <a:off x="20" y="10"/>
+            <a:ext cx="12191980" cy="6857990"/>
+          </a:xfrm>
+          <a:prstGeom prst="rect">
+            <a:avLst/>
+          </a:prstGeom>
+        </p:spPr>
+      </p:pic>
+      <p:sp>
+        <p:nvSpPr>
           <p:cNvPr id="2" name="Title 1">
             <a:extLst>
               <a:ext uri="{FF2B5EF4-FFF2-40B4-BE49-F238E27FC236}">
-                <a16:creationId xmlns:a16="http://schemas.microsoft.com/office/drawing/2014/main" id="{D5C62DC0-7B24-406B-895F-9F7A998B97F5}"/>
+                <a16:creationId xmlns:a16="http://schemas.microsoft.com/office/drawing/2014/main" xmlns="" id="{D5C62DC0-7B24-406B-895F-9F7A998B97F5}"/>
               </a:ext>
             </a:extLst>
           </p:cNvPr>
@@ -8558,7 +9366,7 @@
           <p:cNvPr id="3" name="Subtitle 2">
             <a:extLst>
               <a:ext uri="{FF2B5EF4-FFF2-40B4-BE49-F238E27FC236}">
-                <a16:creationId xmlns:a16="http://schemas.microsoft.com/office/drawing/2014/main" id="{BC722BCA-39B6-466D-8B59-13CEFC854F1C}"/>
+                <a16:creationId xmlns:a16="http://schemas.microsoft.com/office/drawing/2014/main" xmlns="" id="{BC722BCA-39B6-466D-8B59-13CEFC854F1C}"/>
               </a:ext>
             </a:extLst>
           </p:cNvPr>
@@ -8602,6 +9410,13 @@
   <p:clrMapOvr>
     <a:masterClrMapping/>
   </p:clrMapOvr>
+  <p:timing>
+    <p:tnLst>
+      <p:par>
+        <p:cTn id="1" dur="indefinite" restart="never" nodeType="tmRoot"/>
+      </p:par>
+    </p:tnLst>
+  </p:timing>
 </p:sld>
 </file>
 
@@ -8636,7 +9451,7 @@
           <p:cNvPr id="15" name="Picture 3" descr="A picture containing rain&#10;&#10;Description automatically generated">
             <a:extLst>
               <a:ext uri="{FF2B5EF4-FFF2-40B4-BE49-F238E27FC236}">
-                <a16:creationId xmlns:a16="http://schemas.microsoft.com/office/drawing/2014/main" id="{5ED1E333-3635-4CA6-AFDB-F8A6394D9954}"/>
+                <a16:creationId xmlns:a16="http://schemas.microsoft.com/office/drawing/2014/main" xmlns="" id="{5ED1E333-3635-4CA6-AFDB-F8A6394D9954}"/>
               </a:ext>
             </a:extLst>
           </p:cNvPr>
@@ -8674,7 +9489,7 @@
           <p:cNvPr id="4" name="Rectangle 3">
             <a:extLst>
               <a:ext uri="{FF2B5EF4-FFF2-40B4-BE49-F238E27FC236}">
-                <a16:creationId xmlns:a16="http://schemas.microsoft.com/office/drawing/2014/main" id="{CABC14D6-5602-4542-9A48-0B9DFC1F251E}"/>
+                <a16:creationId xmlns:a16="http://schemas.microsoft.com/office/drawing/2014/main" xmlns="" id="{CABC14D6-5602-4542-9A48-0B9DFC1F251E}"/>
               </a:ext>
             </a:extLst>
           </p:cNvPr>
@@ -8749,7 +9564,7 @@
           <p:cNvPr id="3" name="Picture 2" descr="A picture containing drawing&#10;&#10;Description automatically generated">
             <a:extLst>
               <a:ext uri="{FF2B5EF4-FFF2-40B4-BE49-F238E27FC236}">
-                <a16:creationId xmlns:a16="http://schemas.microsoft.com/office/drawing/2014/main" id="{1EDCF81A-1A0E-4069-94B7-F197BB7C2882}"/>
+                <a16:creationId xmlns:a16="http://schemas.microsoft.com/office/drawing/2014/main" xmlns="" id="{1EDCF81A-1A0E-4069-94B7-F197BB7C2882}"/>
               </a:ext>
             </a:extLst>
           </p:cNvPr>
@@ -8785,7 +9600,7 @@
           <p:cNvPr id="6" name="Picture 5" descr="A picture containing drawing&#10;&#10;Description automatically generated">
             <a:extLst>
               <a:ext uri="{FF2B5EF4-FFF2-40B4-BE49-F238E27FC236}">
-                <a16:creationId xmlns:a16="http://schemas.microsoft.com/office/drawing/2014/main" id="{CE3251DC-F020-4E3D-8D89-D326DA3D226D}"/>
+                <a16:creationId xmlns:a16="http://schemas.microsoft.com/office/drawing/2014/main" xmlns="" id="{CE3251DC-F020-4E3D-8D89-D326DA3D226D}"/>
               </a:ext>
             </a:extLst>
           </p:cNvPr>
@@ -8821,7 +9636,7 @@
           <p:cNvPr id="9" name="Picture 8" descr="A picture containing shirt, table&#10;&#10;Description automatically generated">
             <a:extLst>
               <a:ext uri="{FF2B5EF4-FFF2-40B4-BE49-F238E27FC236}">
-                <a16:creationId xmlns:a16="http://schemas.microsoft.com/office/drawing/2014/main" id="{13390DF1-2627-4CD9-8AC8-A1F24617A77F}"/>
+                <a16:creationId xmlns:a16="http://schemas.microsoft.com/office/drawing/2014/main" xmlns="" id="{13390DF1-2627-4CD9-8AC8-A1F24617A77F}"/>
               </a:ext>
             </a:extLst>
           </p:cNvPr>
@@ -8857,7 +9672,7 @@
           <p:cNvPr id="10" name="TextBox 9">
             <a:extLst>
               <a:ext uri="{FF2B5EF4-FFF2-40B4-BE49-F238E27FC236}">
-                <a16:creationId xmlns:a16="http://schemas.microsoft.com/office/drawing/2014/main" id="{E955D2DA-2EF1-4DA5-BD3B-8090CD5D276B}"/>
+                <a16:creationId xmlns:a16="http://schemas.microsoft.com/office/drawing/2014/main" xmlns="" id="{E955D2DA-2EF1-4DA5-BD3B-8090CD5D276B}"/>
               </a:ext>
             </a:extLst>
           </p:cNvPr>
@@ -8893,7 +9708,7 @@
           <p:cNvPr id="12" name="TextBox 11">
             <a:extLst>
               <a:ext uri="{FF2B5EF4-FFF2-40B4-BE49-F238E27FC236}">
-                <a16:creationId xmlns:a16="http://schemas.microsoft.com/office/drawing/2014/main" id="{E63D7127-2E47-4E7E-9BDE-96EDE219B23C}"/>
+                <a16:creationId xmlns:a16="http://schemas.microsoft.com/office/drawing/2014/main" xmlns="" id="{E63D7127-2E47-4E7E-9BDE-96EDE219B23C}"/>
               </a:ext>
             </a:extLst>
           </p:cNvPr>
@@ -8967,7 +9782,7 @@
           <p:cNvPr id="15" name="Picture 3" descr="A picture containing rain&#10;&#10;Description automatically generated">
             <a:extLst>
               <a:ext uri="{FF2B5EF4-FFF2-40B4-BE49-F238E27FC236}">
-                <a16:creationId xmlns:a16="http://schemas.microsoft.com/office/drawing/2014/main" id="{5ED1E333-3635-4CA6-AFDB-F8A6394D9954}"/>
+                <a16:creationId xmlns:a16="http://schemas.microsoft.com/office/drawing/2014/main" xmlns="" id="{5ED1E333-3635-4CA6-AFDB-F8A6394D9954}"/>
               </a:ext>
             </a:extLst>
           </p:cNvPr>
@@ -9005,7 +9820,7 @@
           <p:cNvPr id="4" name="Rectangle 3">
             <a:extLst>
               <a:ext uri="{FF2B5EF4-FFF2-40B4-BE49-F238E27FC236}">
-                <a16:creationId xmlns:a16="http://schemas.microsoft.com/office/drawing/2014/main" id="{CABC14D6-5602-4542-9A48-0B9DFC1F251E}"/>
+                <a16:creationId xmlns:a16="http://schemas.microsoft.com/office/drawing/2014/main" xmlns="" id="{CABC14D6-5602-4542-9A48-0B9DFC1F251E}"/>
               </a:ext>
             </a:extLst>
           </p:cNvPr>
@@ -9059,7 +9874,7 @@
           <p:cNvPr id="7" name="TextBox 6">
             <a:extLst>
               <a:ext uri="{FF2B5EF4-FFF2-40B4-BE49-F238E27FC236}">
-                <a16:creationId xmlns:a16="http://schemas.microsoft.com/office/drawing/2014/main" id="{F588BE1A-C581-4F2C-AD35-16EB4660EC1B}"/>
+                <a16:creationId xmlns:a16="http://schemas.microsoft.com/office/drawing/2014/main" xmlns="" id="{F588BE1A-C581-4F2C-AD35-16EB4660EC1B}"/>
               </a:ext>
             </a:extLst>
           </p:cNvPr>
@@ -9069,7 +9884,7 @@
         <p:spPr>
           <a:xfrm>
             <a:off x="4001679" y="1909791"/>
-            <a:ext cx="7630998" cy="4401205"/>
+            <a:ext cx="7630998" cy="3170099"/>
           </a:xfrm>
           <a:prstGeom prst="rect">
             <a:avLst/>
@@ -9088,7 +9903,7 @@
             </a:r>
             <a:r>
               <a:rPr lang="en-US" altLang="zh-CN" sz="4000" dirty="0"/>
-              <a:t>in center Manhattan</a:t>
+              <a:t>in center city</a:t>
             </a:r>
             <a:r>
               <a:rPr lang="en-US" sz="4000" dirty="0"/>
@@ -9100,8 +9915,9 @@
             </a:r>
             <a:r>
               <a:rPr lang="en-US" sz="4000" dirty="0"/>
-              <a:t>, help and save the guinea pigs inside the pet store. Let them escape from the dangerous building.</a:t>
-            </a:r>
+              <a:t>, help and save their lives. Let them escape from the dangerous building.</a:t>
+            </a:r>
+            <a:endParaRPr lang="en-US" sz="4000" dirty="0"/>
           </a:p>
         </p:txBody>
       </p:sp>
@@ -9149,7 +9965,7 @@
           <p:cNvPr id="15" name="Picture 3" descr="A picture containing rain&#10;&#10;Description automatically generated">
             <a:extLst>
               <a:ext uri="{FF2B5EF4-FFF2-40B4-BE49-F238E27FC236}">
-                <a16:creationId xmlns:a16="http://schemas.microsoft.com/office/drawing/2014/main" id="{5ED1E333-3635-4CA6-AFDB-F8A6394D9954}"/>
+                <a16:creationId xmlns:a16="http://schemas.microsoft.com/office/drawing/2014/main" xmlns="" id="{5ED1E333-3635-4CA6-AFDB-F8A6394D9954}"/>
               </a:ext>
             </a:extLst>
           </p:cNvPr>
@@ -9187,7 +10003,7 @@
           <p:cNvPr id="5" name="Rectangle 4">
             <a:extLst>
               <a:ext uri="{FF2B5EF4-FFF2-40B4-BE49-F238E27FC236}">
-                <a16:creationId xmlns:a16="http://schemas.microsoft.com/office/drawing/2014/main" id="{DFADFC5E-B857-4CED-8909-55E507DF1C87}"/>
+                <a16:creationId xmlns:a16="http://schemas.microsoft.com/office/drawing/2014/main" xmlns="" id="{DFADFC5E-B857-4CED-8909-55E507DF1C87}"/>
               </a:ext>
             </a:extLst>
           </p:cNvPr>
@@ -9292,7 +10108,7 @@
           <p:cNvPr id="15" name="Picture 3" descr="A picture containing rain&#10;&#10;Description automatically generated">
             <a:extLst>
               <a:ext uri="{FF2B5EF4-FFF2-40B4-BE49-F238E27FC236}">
-                <a16:creationId xmlns:a16="http://schemas.microsoft.com/office/drawing/2014/main" id="{5ED1E333-3635-4CA6-AFDB-F8A6394D9954}"/>
+                <a16:creationId xmlns:a16="http://schemas.microsoft.com/office/drawing/2014/main" xmlns="" id="{5ED1E333-3635-4CA6-AFDB-F8A6394D9954}"/>
               </a:ext>
             </a:extLst>
           </p:cNvPr>
@@ -9330,7 +10146,7 @@
           <p:cNvPr id="4" name="Rectangle 3">
             <a:extLst>
               <a:ext uri="{FF2B5EF4-FFF2-40B4-BE49-F238E27FC236}">
-                <a16:creationId xmlns:a16="http://schemas.microsoft.com/office/drawing/2014/main" id="{8AAD79F5-1511-406F-9CD3-A4BD825C32E7}"/>
+                <a16:creationId xmlns:a16="http://schemas.microsoft.com/office/drawing/2014/main" xmlns="" id="{8AAD79F5-1511-406F-9CD3-A4BD825C32E7}"/>
               </a:ext>
             </a:extLst>
           </p:cNvPr>
@@ -9380,7 +10196,7 @@
           <p:cNvPr id="5" name="Rectangle 4">
             <a:extLst>
               <a:ext uri="{FF2B5EF4-FFF2-40B4-BE49-F238E27FC236}">
-                <a16:creationId xmlns:a16="http://schemas.microsoft.com/office/drawing/2014/main" id="{1E345FDF-A275-4E6E-8621-3DF090845A72}"/>
+                <a16:creationId xmlns:a16="http://schemas.microsoft.com/office/drawing/2014/main" xmlns="" id="{1E345FDF-A275-4E6E-8621-3DF090845A72}"/>
               </a:ext>
             </a:extLst>
           </p:cNvPr>
@@ -9428,7 +10244,7 @@
           <p:cNvPr id="6" name="TextBox 5">
             <a:extLst>
               <a:ext uri="{FF2B5EF4-FFF2-40B4-BE49-F238E27FC236}">
-                <a16:creationId xmlns:a16="http://schemas.microsoft.com/office/drawing/2014/main" id="{2693CE6C-1B3F-4DFE-9422-AAA6B6452AC8}"/>
+                <a16:creationId xmlns:a16="http://schemas.microsoft.com/office/drawing/2014/main" xmlns="" id="{2693CE6C-1B3F-4DFE-9422-AAA6B6452AC8}"/>
               </a:ext>
             </a:extLst>
           </p:cNvPr>
@@ -9466,7 +10282,7 @@
           <a:p>
             <a:r>
               <a:rPr lang="en-US" sz="2400" dirty="0"/>
-              <a:t>When there is </a:t>
+              <a:t>When there are </a:t>
             </a:r>
             <a:r>
               <a:rPr lang="en-US" sz="2400" b="1" dirty="0">
@@ -9474,11 +10290,11 @@
                   <a:srgbClr val="00B0F0"/>
                 </a:solidFill>
               </a:rPr>
-              <a:t>at least one </a:t>
+              <a:t>more than one </a:t>
             </a:r>
             <a:r>
               <a:rPr lang="en-US" sz="2400" dirty="0"/>
-              <a:t>guinea pig </a:t>
+              <a:t>guinea pigs </a:t>
             </a:r>
             <a:r>
               <a:rPr lang="en-US" sz="2400" b="1" dirty="0">
@@ -9486,7 +10302,7 @@
                   <a:srgbClr val="00B0F0"/>
                 </a:solidFill>
               </a:rPr>
-              <a:t>arrived at the exit area</a:t>
+              <a:t>arriving at the exit area</a:t>
             </a:r>
             <a:r>
               <a:rPr lang="en-US" sz="2400" dirty="0"/>
@@ -9554,6 +10370,13 @@
   <p:clrMapOvr>
     <a:masterClrMapping/>
   </p:clrMapOvr>
+  <p:timing>
+    <p:tnLst>
+      <p:par>
+        <p:cTn id="1" dur="indefinite" restart="never" nodeType="tmRoot"/>
+      </p:par>
+    </p:tnLst>
+  </p:timing>
 </p:sld>
 </file>
 
@@ -9588,7 +10411,7 @@
           <p:cNvPr id="15" name="Picture 3" descr="A picture containing rain&#10;&#10;Description automatically generated">
             <a:extLst>
               <a:ext uri="{FF2B5EF4-FFF2-40B4-BE49-F238E27FC236}">
-                <a16:creationId xmlns:a16="http://schemas.microsoft.com/office/drawing/2014/main" id="{5ED1E333-3635-4CA6-AFDB-F8A6394D9954}"/>
+                <a16:creationId xmlns:a16="http://schemas.microsoft.com/office/drawing/2014/main" xmlns="" id="{5ED1E333-3635-4CA6-AFDB-F8A6394D9954}"/>
               </a:ext>
             </a:extLst>
           </p:cNvPr>
@@ -9626,7 +10449,7 @@
           <p:cNvPr id="4" name="Rectangle 3">
             <a:extLst>
               <a:ext uri="{FF2B5EF4-FFF2-40B4-BE49-F238E27FC236}">
-                <a16:creationId xmlns:a16="http://schemas.microsoft.com/office/drawing/2014/main" id="{8AAD79F5-1511-406F-9CD3-A4BD825C32E7}"/>
+                <a16:creationId xmlns:a16="http://schemas.microsoft.com/office/drawing/2014/main" xmlns="" id="{8AAD79F5-1511-406F-9CD3-A4BD825C32E7}"/>
               </a:ext>
             </a:extLst>
           </p:cNvPr>
@@ -9676,7 +10499,7 @@
           <p:cNvPr id="5" name="Rectangle 4">
             <a:extLst>
               <a:ext uri="{FF2B5EF4-FFF2-40B4-BE49-F238E27FC236}">
-                <a16:creationId xmlns:a16="http://schemas.microsoft.com/office/drawing/2014/main" id="{1E345FDF-A275-4E6E-8621-3DF090845A72}"/>
+                <a16:creationId xmlns:a16="http://schemas.microsoft.com/office/drawing/2014/main" xmlns="" id="{1E345FDF-A275-4E6E-8621-3DF090845A72}"/>
               </a:ext>
             </a:extLst>
           </p:cNvPr>
@@ -9734,7 +10557,7 @@
           <p:cNvPr id="2" name="TextBox 1">
             <a:extLst>
               <a:ext uri="{FF2B5EF4-FFF2-40B4-BE49-F238E27FC236}">
-                <a16:creationId xmlns:a16="http://schemas.microsoft.com/office/drawing/2014/main" id="{54272A9E-3FCD-4CCB-9E72-FD09A8328BD4}"/>
+                <a16:creationId xmlns:a16="http://schemas.microsoft.com/office/drawing/2014/main" xmlns="" id="{54272A9E-3FCD-4CCB-9E72-FD09A8328BD4}"/>
               </a:ext>
             </a:extLst>
           </p:cNvPr>
@@ -9744,7 +10567,7 @@
         <p:spPr>
           <a:xfrm>
             <a:off x="2436829" y="2580123"/>
-            <a:ext cx="9323110" cy="4154984"/>
+            <a:ext cx="9323110" cy="4524315"/>
           </a:xfrm>
           <a:prstGeom prst="rect">
             <a:avLst/>
@@ -9758,7 +10581,7 @@
           <a:lstStyle/>
           <a:p>
             <a:r>
-              <a:rPr lang="en-US" sz="2400" dirty="0"/>
+              <a:rPr lang="en-US" sz="2400" dirty="0" smtClean="0"/>
               <a:t>The </a:t>
             </a:r>
             <a:r>
@@ -9767,11 +10590,139 @@
                   <a:srgbClr val="00B0F0"/>
                 </a:solidFill>
               </a:rPr>
-              <a:t>leading guinea pigs </a:t>
+              <a:t>leading guinea pig </a:t>
             </a:r>
             <a:r>
               <a:rPr lang="en-US" sz="2400" dirty="0"/>
-              <a:t>will move straight ahead along the </a:t>
+              <a:t>will move along with the default direction.</a:t>
+            </a:r>
+          </a:p>
+          <a:p>
+            <a:endParaRPr lang="en-US" sz="2400" dirty="0"/>
+          </a:p>
+          <a:p>
+            <a:r>
+              <a:rPr lang="en-US" sz="2400" dirty="0"/>
+              <a:t>The rest of guinea pigs </a:t>
+            </a:r>
+            <a:r>
+              <a:rPr lang="en-US" sz="2400" b="1" dirty="0">
+                <a:solidFill>
+                  <a:srgbClr val="00B0F0"/>
+                </a:solidFill>
+              </a:rPr>
+              <a:t>in this team </a:t>
+            </a:r>
+            <a:r>
+              <a:rPr lang="en-US" sz="2400" dirty="0"/>
+              <a:t>will </a:t>
+            </a:r>
+            <a:r>
+              <a:rPr lang="en-US" sz="2400" b="1" dirty="0"/>
+              <a:t>follow</a:t>
+            </a:r>
+            <a:r>
+              <a:rPr lang="en-US" sz="2400" dirty="0"/>
+              <a:t> </a:t>
+            </a:r>
+            <a:r>
+              <a:rPr lang="en-US" sz="2400" b="1" dirty="0">
+                <a:solidFill>
+                  <a:srgbClr val="00B0F0"/>
+                </a:solidFill>
+              </a:rPr>
+              <a:t>the guinea pig who is walking in front of it</a:t>
+            </a:r>
+            <a:r>
+              <a:rPr lang="en-US" altLang="zh-CN" sz="2400" b="1" dirty="0" smtClean="0">
+                <a:solidFill>
+                  <a:srgbClr val="00B0F0"/>
+                </a:solidFill>
+              </a:rPr>
+              <a:t>.</a:t>
+            </a:r>
+          </a:p>
+          <a:p>
+            <a:endParaRPr lang="en-US" altLang="zh-CN" sz="2400" b="1" dirty="0">
+              <a:solidFill>
+                <a:srgbClr val="00B0F0"/>
+              </a:solidFill>
+            </a:endParaRPr>
+          </a:p>
+          <a:p>
+            <a:r>
+              <a:rPr lang="en-US" sz="2400" dirty="0"/>
+              <a:t>The guinea pig will </a:t>
+            </a:r>
+            <a:r>
+              <a:rPr lang="en-US" sz="2400" b="1" dirty="0">
+                <a:solidFill>
+                  <a:srgbClr val="7030A0"/>
+                </a:solidFill>
+              </a:rPr>
+              <a:t>stop</a:t>
+            </a:r>
+            <a:r>
+              <a:rPr lang="en-US" sz="2400" dirty="0"/>
+              <a:t> when it </a:t>
+            </a:r>
+            <a:r>
+              <a:rPr lang="en-US" sz="2400" b="1" dirty="0"/>
+              <a:t>moves to </a:t>
+            </a:r>
+            <a:r>
+              <a:rPr lang="en-US" sz="2400" dirty="0"/>
+              <a:t>a </a:t>
+            </a:r>
+            <a:r>
+              <a:rPr lang="en-US" sz="2400" b="1" dirty="0"/>
+              <a:t>wall</a:t>
+            </a:r>
+            <a:r>
+              <a:rPr lang="zh-CN" altLang="en-US" sz="2400" b="1" dirty="0"/>
+              <a:t> </a:t>
+            </a:r>
+            <a:r>
+              <a:rPr lang="en-US" altLang="zh-CN" sz="2400" dirty="0"/>
+              <a:t>or</a:t>
+            </a:r>
+            <a:r>
+              <a:rPr lang="zh-CN" altLang="en-US" sz="2400" b="1" dirty="0"/>
+              <a:t> </a:t>
+            </a:r>
+            <a:r>
+              <a:rPr lang="en-US" altLang="zh-CN" sz="2400" b="1" dirty="0"/>
+              <a:t>bumps</a:t>
+            </a:r>
+            <a:r>
+              <a:rPr lang="zh-CN" altLang="en-US" sz="2400" b="1" dirty="0"/>
+              <a:t> </a:t>
+            </a:r>
+            <a:r>
+              <a:rPr lang="en-US" altLang="zh-CN" sz="2400" b="1" dirty="0"/>
+              <a:t>with</a:t>
+            </a:r>
+            <a:r>
+              <a:rPr lang="zh-CN" altLang="en-US" sz="2400" b="1" dirty="0"/>
+              <a:t> </a:t>
+            </a:r>
+            <a:r>
+              <a:rPr lang="en-US" altLang="zh-CN" sz="2400" b="1" dirty="0"/>
+              <a:t>obstacle.</a:t>
+            </a:r>
+            <a:endParaRPr lang="en-US" sz="2400" b="1" dirty="0"/>
+          </a:p>
+          <a:p>
+            <a:endParaRPr lang="en-US" sz="2400" b="1" dirty="0">
+              <a:solidFill>
+                <a:srgbClr val="00B0F0"/>
+              </a:solidFill>
+            </a:endParaRPr>
+          </a:p>
+          <a:p>
+            <a:r>
+              <a:rPr lang="en-US" sz="2400" dirty="0"/>
+              <a:t>The </a:t>
             </a:r>
             <a:r>
               <a:rPr lang="en-US" sz="2400" b="1" dirty="0">
@@ -9783,113 +10734,6 @@
             </a:r>
             <a:r>
               <a:rPr lang="en-US" sz="2400" dirty="0"/>
-              <a:t> that it is </a:t>
-            </a:r>
-            <a:r>
-              <a:rPr lang="en-US" sz="2400" b="1" dirty="0"/>
-              <a:t>facing towards </a:t>
-            </a:r>
-            <a:r>
-              <a:rPr lang="en-US" sz="2400" dirty="0"/>
-              <a:t>automatically.</a:t>
-            </a:r>
-          </a:p>
-          <a:p>
-            <a:endParaRPr lang="en-US" sz="2400" dirty="0"/>
-          </a:p>
-          <a:p>
-            <a:r>
-              <a:rPr lang="en-US" sz="2400" dirty="0"/>
-              <a:t>The rest of guinea pigs </a:t>
-            </a:r>
-            <a:r>
-              <a:rPr lang="en-US" sz="2400" b="1" dirty="0">
-                <a:solidFill>
-                  <a:srgbClr val="00B0F0"/>
-                </a:solidFill>
-              </a:rPr>
-              <a:t>in this team </a:t>
-            </a:r>
-            <a:r>
-              <a:rPr lang="en-US" sz="2400" dirty="0"/>
-              <a:t>will </a:t>
-            </a:r>
-            <a:r>
-              <a:rPr lang="en-US" sz="2400" b="1" dirty="0"/>
-              <a:t>follow</a:t>
-            </a:r>
-            <a:r>
-              <a:rPr lang="en-US" sz="2400" dirty="0"/>
-              <a:t> </a:t>
-            </a:r>
-            <a:r>
-              <a:rPr lang="en-US" sz="2400" b="1" dirty="0">
-                <a:solidFill>
-                  <a:srgbClr val="00B0F0"/>
-                </a:solidFill>
-              </a:rPr>
-              <a:t>the guinea pig who is walking in front of it</a:t>
-            </a:r>
-          </a:p>
-          <a:p>
-            <a:endParaRPr lang="en-US" sz="2400" b="1" dirty="0">
-              <a:solidFill>
-                <a:srgbClr val="00B0F0"/>
-              </a:solidFill>
-            </a:endParaRPr>
-          </a:p>
-          <a:p>
-            <a:r>
-              <a:rPr lang="en-US" sz="2400" dirty="0"/>
-              <a:t>The guinea pig will </a:t>
-            </a:r>
-            <a:r>
-              <a:rPr lang="en-US" sz="2400" b="1" dirty="0">
-                <a:solidFill>
-                  <a:srgbClr val="7030A0"/>
-                </a:solidFill>
-              </a:rPr>
-              <a:t>stop</a:t>
-            </a:r>
-            <a:r>
-              <a:rPr lang="en-US" sz="2400" dirty="0"/>
-              <a:t> when it </a:t>
-            </a:r>
-            <a:r>
-              <a:rPr lang="en-US" sz="2400" b="1" dirty="0"/>
-              <a:t>moves to </a:t>
-            </a:r>
-            <a:r>
-              <a:rPr lang="en-US" sz="2400" dirty="0"/>
-              <a:t>a </a:t>
-            </a:r>
-            <a:r>
-              <a:rPr lang="en-US" sz="2400" b="1" dirty="0"/>
-              <a:t>wall</a:t>
-            </a:r>
-          </a:p>
-          <a:p>
-            <a:endParaRPr lang="en-US" sz="2400" b="1" dirty="0">
-              <a:solidFill>
-                <a:srgbClr val="00B0F0"/>
-              </a:solidFill>
-            </a:endParaRPr>
-          </a:p>
-          <a:p>
-            <a:r>
-              <a:rPr lang="en-US" sz="2400" dirty="0"/>
-              <a:t>The </a:t>
-            </a:r>
-            <a:r>
-              <a:rPr lang="en-US" sz="2400" b="1" dirty="0">
-                <a:solidFill>
-                  <a:srgbClr val="FF0000"/>
-                </a:solidFill>
-              </a:rPr>
-              <a:t>direction</a:t>
-            </a:r>
-            <a:r>
-              <a:rPr lang="en-US" sz="2400" dirty="0"/>
               <a:t> of guinea pigs will only </a:t>
             </a:r>
             <a:r>
@@ -9913,33 +10757,57 @@
               <a:t> use </a:t>
             </a:r>
             <a:r>
+              <a:rPr lang="en-US" altLang="zh-CN" sz="2400" b="1" dirty="0">
+                <a:solidFill>
+                  <a:srgbClr val="00B050"/>
+                </a:solidFill>
+              </a:rPr>
+              <a:t>tool</a:t>
+            </a:r>
+            <a:r>
               <a:rPr lang="en-US" sz="2400" b="1" dirty="0">
                 <a:solidFill>
                   <a:srgbClr val="00B050"/>
                 </a:solidFill>
               </a:rPr>
-              <a:t>the mouse </a:t>
+              <a:t> </a:t>
             </a:r>
             <a:r>
               <a:rPr lang="en-US" sz="2400" dirty="0"/>
               <a:t>to guide them</a:t>
             </a:r>
-          </a:p>
-          <a:p>
+            <a:r>
+              <a:rPr lang="en-US" altLang="zh-CN" sz="2400" dirty="0"/>
+              <a:t>.</a:t>
+            </a:r>
             <a:endParaRPr lang="en-US" sz="2400" dirty="0"/>
+          </a:p>
+          <a:p>
+            <a:endParaRPr lang="zh-CN" altLang="en-US" sz="2400" b="1" dirty="0" smtClean="0">
+              <a:solidFill>
+                <a:srgbClr val="00B0F0"/>
+              </a:solidFill>
+            </a:endParaRPr>
           </a:p>
         </p:txBody>
       </p:sp>
     </p:spTree>
     <p:extLst>
       <p:ext uri="{BB962C8B-B14F-4D97-AF65-F5344CB8AC3E}">
-        <p14:creationId xmlns:p14="http://schemas.microsoft.com/office/powerpoint/2010/main" val="2067944583"/>
+        <p14:creationId xmlns:p14="http://schemas.microsoft.com/office/powerpoint/2010/main" val="1276145346"/>
       </p:ext>
     </p:extLst>
   </p:cSld>
   <p:clrMapOvr>
     <a:masterClrMapping/>
   </p:clrMapOvr>
+  <p:timing>
+    <p:tnLst>
+      <p:par>
+        <p:cTn id="1" dur="indefinite" restart="never" nodeType="tmRoot"/>
+      </p:par>
+    </p:tnLst>
+  </p:timing>
 </p:sld>
 </file>
 
@@ -9974,7 +10842,7 @@
           <p:cNvPr id="15" name="Picture 3" descr="A picture containing rain&#10;&#10;Description automatically generated">
             <a:extLst>
               <a:ext uri="{FF2B5EF4-FFF2-40B4-BE49-F238E27FC236}">
-                <a16:creationId xmlns:a16="http://schemas.microsoft.com/office/drawing/2014/main" id="{5ED1E333-3635-4CA6-AFDB-F8A6394D9954}"/>
+                <a16:creationId xmlns:a16="http://schemas.microsoft.com/office/drawing/2014/main" xmlns="" id="{5ED1E333-3635-4CA6-AFDB-F8A6394D9954}"/>
               </a:ext>
             </a:extLst>
           </p:cNvPr>
@@ -10012,7 +10880,7 @@
           <p:cNvPr id="4" name="Rectangle 3">
             <a:extLst>
               <a:ext uri="{FF2B5EF4-FFF2-40B4-BE49-F238E27FC236}">
-                <a16:creationId xmlns:a16="http://schemas.microsoft.com/office/drawing/2014/main" id="{8AAD79F5-1511-406F-9CD3-A4BD825C32E7}"/>
+                <a16:creationId xmlns:a16="http://schemas.microsoft.com/office/drawing/2014/main" xmlns="" id="{8AAD79F5-1511-406F-9CD3-A4BD825C32E7}"/>
               </a:ext>
             </a:extLst>
           </p:cNvPr>
@@ -10062,7 +10930,7 @@
           <p:cNvPr id="5" name="Rectangle 4">
             <a:extLst>
               <a:ext uri="{FF2B5EF4-FFF2-40B4-BE49-F238E27FC236}">
-                <a16:creationId xmlns:a16="http://schemas.microsoft.com/office/drawing/2014/main" id="{1E345FDF-A275-4E6E-8621-3DF090845A72}"/>
+                <a16:creationId xmlns:a16="http://schemas.microsoft.com/office/drawing/2014/main" xmlns="" id="{1E345FDF-A275-4E6E-8621-3DF090845A72}"/>
               </a:ext>
             </a:extLst>
           </p:cNvPr>
@@ -10120,7 +10988,7 @@
           <p:cNvPr id="2" name="TextBox 1">
             <a:extLst>
               <a:ext uri="{FF2B5EF4-FFF2-40B4-BE49-F238E27FC236}">
-                <a16:creationId xmlns:a16="http://schemas.microsoft.com/office/drawing/2014/main" id="{A388191E-47E9-451D-96BF-B368638C181C}"/>
+                <a16:creationId xmlns:a16="http://schemas.microsoft.com/office/drawing/2014/main" xmlns="" id="{A388191E-47E9-451D-96BF-B368638C181C}"/>
               </a:ext>
             </a:extLst>
           </p:cNvPr>
@@ -10164,7 +11032,7 @@
           <p:cNvPr id="6" name="Picture 3" descr="A picture containing rain&#10;&#10;Description automatically generated">
             <a:extLst>
               <a:ext uri="{FF2B5EF4-FFF2-40B4-BE49-F238E27FC236}">
-                <a16:creationId xmlns:a16="http://schemas.microsoft.com/office/drawing/2014/main" id="{F158DC90-5797-49D5-9DA6-5476A87ABB1D}"/>
+                <a16:creationId xmlns:a16="http://schemas.microsoft.com/office/drawing/2014/main" xmlns="" id="{F158DC90-5797-49D5-9DA6-5476A87ABB1D}"/>
               </a:ext>
             </a:extLst>
           </p:cNvPr>
@@ -10207,6 +11075,13 @@
   <p:clrMapOvr>
     <a:masterClrMapping/>
   </p:clrMapOvr>
+  <p:timing>
+    <p:tnLst>
+      <p:par>
+        <p:cTn id="1" dur="indefinite" restart="never" nodeType="tmRoot"/>
+      </p:par>
+    </p:tnLst>
+  </p:timing>
 </p:sld>
 </file>
 
@@ -10216,7 +11091,7 @@
     <p:bg>
       <p:bgPr>
         <a:blipFill>
-          <a:blip r:embed="rId2"/>
+          <a:blip r:embed="rId3"/>
           <a:tile tx="0" ty="0" sx="100000" sy="100000" flip="none" algn="tl"/>
         </a:blipFill>
         <a:effectLst/>
@@ -10241,7 +11116,7 @@
           <p:cNvPr id="15" name="Picture 3" descr="A picture containing rain&#10;&#10;Description automatically generated">
             <a:extLst>
               <a:ext uri="{FF2B5EF4-FFF2-40B4-BE49-F238E27FC236}">
-                <a16:creationId xmlns:a16="http://schemas.microsoft.com/office/drawing/2014/main" id="{5ED1E333-3635-4CA6-AFDB-F8A6394D9954}"/>
+                <a16:creationId xmlns:a16="http://schemas.microsoft.com/office/drawing/2014/main" xmlns="" id="{5ED1E333-3635-4CA6-AFDB-F8A6394D9954}"/>
               </a:ext>
             </a:extLst>
           </p:cNvPr>
@@ -10251,7 +11126,7 @@
           <p:nvPr/>
         </p:nvPicPr>
         <p:blipFill rotWithShape="1">
-          <a:blip r:embed="rId3">
+          <a:blip r:embed="rId4">
             <a:duotone>
               <a:schemeClr val="bg2">
                 <a:shade val="45000"/>
@@ -10279,7 +11154,7 @@
           <p:cNvPr id="4" name="Rectangle 3">
             <a:extLst>
               <a:ext uri="{FF2B5EF4-FFF2-40B4-BE49-F238E27FC236}">
-                <a16:creationId xmlns:a16="http://schemas.microsoft.com/office/drawing/2014/main" id="{8AAD79F5-1511-406F-9CD3-A4BD825C32E7}"/>
+                <a16:creationId xmlns:a16="http://schemas.microsoft.com/office/drawing/2014/main" xmlns="" id="{8AAD79F5-1511-406F-9CD3-A4BD825C32E7}"/>
               </a:ext>
             </a:extLst>
           </p:cNvPr>
@@ -10329,7 +11204,7 @@
           <p:cNvPr id="5" name="Rectangle 4">
             <a:extLst>
               <a:ext uri="{FF2B5EF4-FFF2-40B4-BE49-F238E27FC236}">
-                <a16:creationId xmlns:a16="http://schemas.microsoft.com/office/drawing/2014/main" id="{1E345FDF-A275-4E6E-8621-3DF090845A72}"/>
+                <a16:creationId xmlns:a16="http://schemas.microsoft.com/office/drawing/2014/main" xmlns="" id="{1E345FDF-A275-4E6E-8621-3DF090845A72}"/>
               </a:ext>
             </a:extLst>
           </p:cNvPr>
@@ -10339,7 +11214,7 @@
         <p:spPr>
           <a:xfrm>
             <a:off x="880626" y="1688414"/>
-            <a:ext cx="10065576" cy="707886"/>
+            <a:ext cx="7196202" cy="707886"/>
           </a:xfrm>
           <a:prstGeom prst="rect">
             <a:avLst/>
@@ -10364,7 +11239,7 @@
                   </a:outerShdw>
                 </a:effectLst>
               </a:rPr>
-              <a:t>Guinea pig teams and how they merge</a:t>
+              <a:t>How guinea pigs make turns</a:t>
             </a:r>
             <a:endParaRPr lang="en-US" sz="4000" b="0" cap="none" spc="0" dirty="0">
               <a:ln w="0"/>
@@ -10382,16 +11257,101 @@
           </a:p>
         </p:txBody>
       </p:sp>
+      <p:sp>
+        <p:nvSpPr>
+          <p:cNvPr id="2" name="TextBox 1">
+            <a:extLst>
+              <a:ext uri="{FF2B5EF4-FFF2-40B4-BE49-F238E27FC236}">
+                <a16:creationId xmlns:a16="http://schemas.microsoft.com/office/drawing/2014/main" xmlns="" id="{A388191E-47E9-451D-96BF-B368638C181C}"/>
+              </a:ext>
+            </a:extLst>
+          </p:cNvPr>
+          <p:cNvSpPr txBox="1"/>
+          <p:nvPr/>
+        </p:nvSpPr>
+        <p:spPr>
+          <a:xfrm>
+            <a:off x="2441542" y="2699656"/>
+            <a:ext cx="5788058" cy="4247317"/>
+          </a:xfrm>
+          <a:prstGeom prst="rect">
+            <a:avLst/>
+          </a:prstGeom>
+          <a:noFill/>
+        </p:spPr>
+        <p:txBody>
+          <a:bodyPr wrap="square" rtlCol="0">
+            <a:spAutoFit/>
+          </a:bodyPr>
+          <a:lstStyle/>
+          <a:p>
+            <a:r>
+              <a:rPr lang="en-US" dirty="0"/>
+              <a:t>Guinea pigs will only make turns when </a:t>
+            </a:r>
+            <a:r>
+              <a:rPr lang="en-US" dirty="0" smtClean="0"/>
+              <a:t>you use timothy hay, which is their favorite food, to navigate them.</a:t>
+            </a:r>
+          </a:p>
+          <a:p>
+            <a:endParaRPr lang="en-US" dirty="0"/>
+          </a:p>
+          <a:p>
+            <a:r>
+              <a:rPr lang="en-US" dirty="0" smtClean="0"/>
+              <a:t>There are grids on floor. </a:t>
+            </a:r>
+            <a:r>
+              <a:rPr lang="en-US" dirty="0" smtClean="0"/>
+              <a:t>t</a:t>
+            </a:r>
+            <a:r>
+              <a:rPr lang="en-US" dirty="0" smtClean="0"/>
+              <a:t>he player can only place the timothy inside a grid.</a:t>
+            </a:r>
+            <a:endParaRPr lang="en-US" dirty="0"/>
+          </a:p>
+          <a:p>
+            <a:endParaRPr lang="en-US" dirty="0"/>
+          </a:p>
+          <a:p>
+            <a:r>
+              <a:rPr lang="en-US" dirty="0" smtClean="0"/>
+              <a:t>A guinea pig can only detect a timothy when it is on the grid that next to the timothy’s grid.</a:t>
+            </a:r>
+          </a:p>
+          <a:p>
+            <a:endParaRPr lang="en-US" dirty="0"/>
+          </a:p>
+          <a:p>
+            <a:r>
+              <a:rPr lang="en-US" dirty="0" smtClean="0"/>
+              <a:t>Once a guinea pig detected the timothy, it will turn to timothy and move with new direction and the guinea pigs behind it will follow it and make turns too.</a:t>
+            </a:r>
+          </a:p>
+          <a:p>
+            <a:endParaRPr lang="en-US" dirty="0"/>
+          </a:p>
+        </p:txBody>
+      </p:sp>
     </p:spTree>
     <p:extLst>
       <p:ext uri="{BB962C8B-B14F-4D97-AF65-F5344CB8AC3E}">
-        <p14:creationId xmlns:p14="http://schemas.microsoft.com/office/powerpoint/2010/main" val="549746681"/>
+        <p14:creationId xmlns:p14="http://schemas.microsoft.com/office/powerpoint/2010/main" val="1794380433"/>
       </p:ext>
     </p:extLst>
   </p:cSld>
   <p:clrMapOvr>
     <a:masterClrMapping/>
   </p:clrMapOvr>
+  <p:timing>
+    <p:tnLst>
+      <p:par>
+        <p:cTn id="1" dur="indefinite" restart="never" nodeType="tmRoot"/>
+      </p:par>
+    </p:tnLst>
+  </p:timing>
 </p:sld>
 </file>
 
@@ -10401,7 +11361,7 @@
     <p:bg>
       <p:bgPr>
         <a:blipFill>
-          <a:blip r:embed="rId2"/>
+          <a:blip r:embed="rId3"/>
           <a:tile tx="0" ty="0" sx="100000" sy="100000" flip="none" algn="tl"/>
         </a:blipFill>
         <a:effectLst/>
@@ -10426,7 +11386,7 @@
           <p:cNvPr id="15" name="Picture 3" descr="A picture containing rain&#10;&#10;Description automatically generated">
             <a:extLst>
               <a:ext uri="{FF2B5EF4-FFF2-40B4-BE49-F238E27FC236}">
-                <a16:creationId xmlns:a16="http://schemas.microsoft.com/office/drawing/2014/main" id="{5ED1E333-3635-4CA6-AFDB-F8A6394D9954}"/>
+                <a16:creationId xmlns:a16="http://schemas.microsoft.com/office/drawing/2014/main" xmlns="" id="{5ED1E333-3635-4CA6-AFDB-F8A6394D9954}"/>
               </a:ext>
             </a:extLst>
           </p:cNvPr>
@@ -10436,7 +11396,7 @@
           <p:nvPr/>
         </p:nvPicPr>
         <p:blipFill rotWithShape="1">
-          <a:blip r:embed="rId3">
+          <a:blip r:embed="rId4">
             <a:duotone>
               <a:schemeClr val="bg2">
                 <a:shade val="45000"/>
@@ -10464,7 +11424,7 @@
           <p:cNvPr id="4" name="Rectangle 3">
             <a:extLst>
               <a:ext uri="{FF2B5EF4-FFF2-40B4-BE49-F238E27FC236}">
-                <a16:creationId xmlns:a16="http://schemas.microsoft.com/office/drawing/2014/main" id="{8AAD79F5-1511-406F-9CD3-A4BD825C32E7}"/>
+                <a16:creationId xmlns:a16="http://schemas.microsoft.com/office/drawing/2014/main" xmlns="" id="{8AAD79F5-1511-406F-9CD3-A4BD825C32E7}"/>
               </a:ext>
             </a:extLst>
           </p:cNvPr>
@@ -10514,7 +11474,7 @@
           <p:cNvPr id="5" name="Rectangle 4">
             <a:extLst>
               <a:ext uri="{FF2B5EF4-FFF2-40B4-BE49-F238E27FC236}">
-                <a16:creationId xmlns:a16="http://schemas.microsoft.com/office/drawing/2014/main" id="{1E345FDF-A275-4E6E-8621-3DF090845A72}"/>
+                <a16:creationId xmlns:a16="http://schemas.microsoft.com/office/drawing/2014/main" xmlns="" id="{1E345FDF-A275-4E6E-8621-3DF090845A72}"/>
               </a:ext>
             </a:extLst>
           </p:cNvPr>
@@ -10523,8 +11483,8 @@
         </p:nvSpPr>
         <p:spPr>
           <a:xfrm>
-            <a:off x="880626" y="1688414"/>
-            <a:ext cx="7061550" cy="707886"/>
+            <a:off x="1016000" y="1688414"/>
+            <a:ext cx="5267872" cy="707886"/>
           </a:xfrm>
           <a:prstGeom prst="rect">
             <a:avLst/>
@@ -10532,14 +11492,13 @@
           <a:noFill/>
         </p:spPr>
         <p:txBody>
-          <a:bodyPr wrap="none" lIns="91440" tIns="45720" rIns="91440" bIns="45720">
+          <a:bodyPr wrap="square" lIns="91440" tIns="45720" rIns="91440" bIns="45720">
             <a:spAutoFit/>
           </a:bodyPr>
           <a:lstStyle/>
           <a:p>
-            <a:pPr algn="ctr"/>
-            <a:r>
-              <a:rPr lang="en-US" sz="4000" dirty="0">
+            <a:r>
+              <a:rPr lang="en-US" sz="4000" dirty="0" smtClean="0">
                 <a:ln w="0"/>
                 <a:effectLst>
                   <a:outerShdw blurRad="38100" dist="19050" dir="2700000" algn="tl" rotWithShape="0">
@@ -10549,7 +11508,7 @@
                   </a:outerShdw>
                 </a:effectLst>
               </a:rPr>
-              <a:t>Dangerous situations (traps)</a:t>
+              <a:t>Split the team</a:t>
             </a:r>
             <a:endParaRPr lang="en-US" sz="4000" b="0" cap="none" spc="0" dirty="0">
               <a:ln w="0"/>
@@ -10567,16 +11526,76 @@
           </a:p>
         </p:txBody>
       </p:sp>
+      <p:sp>
+        <p:nvSpPr>
+          <p:cNvPr id="2" name="TextBox 1">
+            <a:extLst>
+              <a:ext uri="{FF2B5EF4-FFF2-40B4-BE49-F238E27FC236}">
+                <a16:creationId xmlns:a16="http://schemas.microsoft.com/office/drawing/2014/main" xmlns="" id="{A388191E-47E9-451D-96BF-B368638C181C}"/>
+              </a:ext>
+            </a:extLst>
+          </p:cNvPr>
+          <p:cNvSpPr txBox="1"/>
+          <p:nvPr/>
+        </p:nvSpPr>
+        <p:spPr>
+          <a:xfrm>
+            <a:off x="2441542" y="2699656"/>
+            <a:ext cx="5788058" cy="3416320"/>
+          </a:xfrm>
+          <a:prstGeom prst="rect">
+            <a:avLst/>
+          </a:prstGeom>
+          <a:noFill/>
+        </p:spPr>
+        <p:txBody>
+          <a:bodyPr wrap="square" rtlCol="0">
+            <a:spAutoFit/>
+          </a:bodyPr>
+          <a:lstStyle/>
+          <a:p>
+            <a:r>
+              <a:rPr lang="en-US" dirty="0" smtClean="0"/>
+              <a:t>As we discussed earlier, there are grids on floor. If a guinea pig has passed half of the grid, it will ignore the timothy next to it. However, the guinea pig behind it will detect the timothy and make turns.</a:t>
+            </a:r>
+          </a:p>
+          <a:p>
+            <a:endParaRPr lang="en-US" dirty="0"/>
+          </a:p>
+          <a:p>
+            <a:r>
+              <a:rPr lang="en-US" dirty="0" smtClean="0"/>
+              <a:t>In this case, guinea pigs are split into groups and the player still needs to take care of all the guinea pigs.</a:t>
+            </a:r>
+          </a:p>
+          <a:p>
+            <a:endParaRPr lang="en-US" dirty="0"/>
+          </a:p>
+          <a:p>
+            <a:r>
+              <a:rPr lang="en-US" dirty="0" smtClean="0"/>
+              <a:t>The guinea pig teams will not merge if user does not do anything.  </a:t>
+            </a:r>
+          </a:p>
+        </p:txBody>
+      </p:sp>
     </p:spTree>
     <p:extLst>
       <p:ext uri="{BB962C8B-B14F-4D97-AF65-F5344CB8AC3E}">
-        <p14:creationId xmlns:p14="http://schemas.microsoft.com/office/powerpoint/2010/main" val="558036232"/>
+        <p14:creationId xmlns:p14="http://schemas.microsoft.com/office/powerpoint/2010/main" val="1296936497"/>
       </p:ext>
     </p:extLst>
   </p:cSld>
   <p:clrMapOvr>
     <a:masterClrMapping/>
   </p:clrMapOvr>
+  <p:timing>
+    <p:tnLst>
+      <p:par>
+        <p:cTn id="1" dur="indefinite" restart="never" nodeType="tmRoot"/>
+      </p:par>
+    </p:tnLst>
+  </p:timing>
 </p:sld>
 </file>
 

</xml_diff>